<commit_message>
Update BKR Alkatrész Prezentáció.pptx
</commit_message>
<xml_diff>
--- a/Dokumentációk/BKR Alkatrész Prezentáció.pptx
+++ b/Dokumentációk/BKR Alkatrész Prezentáció.pptx
@@ -13,8 +13,9 @@
     <p:sldId id="261" r:id="rId7"/>
     <p:sldId id="262" r:id="rId8"/>
     <p:sldId id="263" r:id="rId9"/>
-    <p:sldId id="264" r:id="rId10"/>
-    <p:sldId id="265" r:id="rId11"/>
+    <p:sldId id="266" r:id="rId10"/>
+    <p:sldId id="264" r:id="rId11"/>
+    <p:sldId id="265" r:id="rId12"/>
   </p:sldIdLst>
   <p:sldSz cx="12192000" cy="6858000"/>
   <p:notesSz cx="6858000" cy="9144000"/>
@@ -163,10 +164,9 @@
           </a:lstStyle>
           <a:p>
             <a:r>
-              <a:rPr lang="hu-HU" smtClean="0"/>
+              <a:rPr lang="hu-HU"/>
               <a:t>Mintacím szerkesztése</a:t>
             </a:r>
-            <a:endParaRPr lang="hu-HU"/>
           </a:p>
         </p:txBody>
       </p:sp>
@@ -228,10 +228,9 @@
           </a:lstStyle>
           <a:p>
             <a:r>
-              <a:rPr lang="hu-HU" smtClean="0"/>
+              <a:rPr lang="hu-HU"/>
               <a:t>Kattintson ide az alcím mintájának szerkesztéséhez</a:t>
             </a:r>
-            <a:endParaRPr lang="hu-HU"/>
           </a:p>
         </p:txBody>
       </p:sp>
@@ -346,10 +345,9 @@
           <a:lstStyle/>
           <a:p>
             <a:r>
-              <a:rPr lang="hu-HU" smtClean="0"/>
+              <a:rPr lang="hu-HU"/>
               <a:t>Mintacím szerkesztése</a:t>
             </a:r>
-            <a:endParaRPr lang="hu-HU"/>
           </a:p>
         </p:txBody>
       </p:sp>
@@ -370,38 +368,37 @@
           <a:p>
             <a:pPr lvl="0"/>
             <a:r>
-              <a:rPr lang="hu-HU" smtClean="0"/>
+              <a:rPr lang="hu-HU"/>
               <a:t>Mintaszöveg szerkesztése</a:t>
             </a:r>
           </a:p>
           <a:p>
             <a:pPr lvl="1"/>
             <a:r>
-              <a:rPr lang="hu-HU" smtClean="0"/>
+              <a:rPr lang="hu-HU"/>
               <a:t>Második szint</a:t>
             </a:r>
           </a:p>
           <a:p>
             <a:pPr lvl="2"/>
             <a:r>
-              <a:rPr lang="hu-HU" smtClean="0"/>
+              <a:rPr lang="hu-HU"/>
               <a:t>Harmadik szint</a:t>
             </a:r>
           </a:p>
           <a:p>
             <a:pPr lvl="3"/>
             <a:r>
-              <a:rPr lang="hu-HU" smtClean="0"/>
+              <a:rPr lang="hu-HU"/>
               <a:t>Negyedik szint</a:t>
             </a:r>
           </a:p>
           <a:p>
             <a:pPr lvl="4"/>
             <a:r>
-              <a:rPr lang="hu-HU" smtClean="0"/>
+              <a:rPr lang="hu-HU"/>
               <a:t>Ötödik szint</a:t>
             </a:r>
-            <a:endParaRPr lang="hu-HU"/>
           </a:p>
         </p:txBody>
       </p:sp>
@@ -521,10 +518,9 @@
           <a:lstStyle/>
           <a:p>
             <a:r>
-              <a:rPr lang="hu-HU" smtClean="0"/>
+              <a:rPr lang="hu-HU"/>
               <a:t>Mintacím szerkesztése</a:t>
             </a:r>
-            <a:endParaRPr lang="hu-HU"/>
           </a:p>
         </p:txBody>
       </p:sp>
@@ -550,38 +546,37 @@
           <a:p>
             <a:pPr lvl="0"/>
             <a:r>
-              <a:rPr lang="hu-HU" smtClean="0"/>
+              <a:rPr lang="hu-HU"/>
               <a:t>Mintaszöveg szerkesztése</a:t>
             </a:r>
           </a:p>
           <a:p>
             <a:pPr lvl="1"/>
             <a:r>
-              <a:rPr lang="hu-HU" smtClean="0"/>
+              <a:rPr lang="hu-HU"/>
               <a:t>Második szint</a:t>
             </a:r>
           </a:p>
           <a:p>
             <a:pPr lvl="2"/>
             <a:r>
-              <a:rPr lang="hu-HU" smtClean="0"/>
+              <a:rPr lang="hu-HU"/>
               <a:t>Harmadik szint</a:t>
             </a:r>
           </a:p>
           <a:p>
             <a:pPr lvl="3"/>
             <a:r>
-              <a:rPr lang="hu-HU" smtClean="0"/>
+              <a:rPr lang="hu-HU"/>
               <a:t>Negyedik szint</a:t>
             </a:r>
           </a:p>
           <a:p>
             <a:pPr lvl="4"/>
             <a:r>
-              <a:rPr lang="hu-HU" smtClean="0"/>
+              <a:rPr lang="hu-HU"/>
               <a:t>Ötödik szint</a:t>
             </a:r>
-            <a:endParaRPr lang="hu-HU"/>
           </a:p>
         </p:txBody>
       </p:sp>
@@ -696,10 +691,9 @@
           <a:lstStyle/>
           <a:p>
             <a:r>
-              <a:rPr lang="hu-HU" smtClean="0"/>
+              <a:rPr lang="hu-HU"/>
               <a:t>Mintacím szerkesztése</a:t>
             </a:r>
-            <a:endParaRPr lang="hu-HU"/>
           </a:p>
         </p:txBody>
       </p:sp>
@@ -720,38 +714,37 @@
           <a:p>
             <a:pPr lvl="0"/>
             <a:r>
-              <a:rPr lang="hu-HU" smtClean="0"/>
+              <a:rPr lang="hu-HU"/>
               <a:t>Mintaszöveg szerkesztése</a:t>
             </a:r>
           </a:p>
           <a:p>
             <a:pPr lvl="1"/>
             <a:r>
-              <a:rPr lang="hu-HU" smtClean="0"/>
+              <a:rPr lang="hu-HU"/>
               <a:t>Második szint</a:t>
             </a:r>
           </a:p>
           <a:p>
             <a:pPr lvl="2"/>
             <a:r>
-              <a:rPr lang="hu-HU" smtClean="0"/>
+              <a:rPr lang="hu-HU"/>
               <a:t>Harmadik szint</a:t>
             </a:r>
           </a:p>
           <a:p>
             <a:pPr lvl="3"/>
             <a:r>
-              <a:rPr lang="hu-HU" smtClean="0"/>
+              <a:rPr lang="hu-HU"/>
               <a:t>Negyedik szint</a:t>
             </a:r>
           </a:p>
           <a:p>
             <a:pPr lvl="4"/>
             <a:r>
-              <a:rPr lang="hu-HU" smtClean="0"/>
+              <a:rPr lang="hu-HU"/>
               <a:t>Ötödik szint</a:t>
             </a:r>
-            <a:endParaRPr lang="hu-HU"/>
           </a:p>
         </p:txBody>
       </p:sp>
@@ -875,10 +868,9 @@
           </a:lstStyle>
           <a:p>
             <a:r>
-              <a:rPr lang="hu-HU" smtClean="0"/>
+              <a:rPr lang="hu-HU"/>
               <a:t>Mintacím szerkesztése</a:t>
             </a:r>
-            <a:endParaRPr lang="hu-HU"/>
           </a:p>
         </p:txBody>
       </p:sp>
@@ -995,7 +987,7 @@
           <a:p>
             <a:pPr lvl="0"/>
             <a:r>
-              <a:rPr lang="hu-HU" smtClean="0"/>
+              <a:rPr lang="hu-HU"/>
               <a:t>Mintaszöveg szerkesztése</a:t>
             </a:r>
           </a:p>
@@ -1112,10 +1104,9 @@
           <a:lstStyle/>
           <a:p>
             <a:r>
-              <a:rPr lang="hu-HU" smtClean="0"/>
+              <a:rPr lang="hu-HU"/>
               <a:t>Mintacím szerkesztése</a:t>
             </a:r>
-            <a:endParaRPr lang="hu-HU"/>
           </a:p>
         </p:txBody>
       </p:sp>
@@ -1141,38 +1132,37 @@
           <a:p>
             <a:pPr lvl="0"/>
             <a:r>
-              <a:rPr lang="hu-HU" smtClean="0"/>
+              <a:rPr lang="hu-HU"/>
               <a:t>Mintaszöveg szerkesztése</a:t>
             </a:r>
           </a:p>
           <a:p>
             <a:pPr lvl="1"/>
             <a:r>
-              <a:rPr lang="hu-HU" smtClean="0"/>
+              <a:rPr lang="hu-HU"/>
               <a:t>Második szint</a:t>
             </a:r>
           </a:p>
           <a:p>
             <a:pPr lvl="2"/>
             <a:r>
-              <a:rPr lang="hu-HU" smtClean="0"/>
+              <a:rPr lang="hu-HU"/>
               <a:t>Harmadik szint</a:t>
             </a:r>
           </a:p>
           <a:p>
             <a:pPr lvl="3"/>
             <a:r>
-              <a:rPr lang="hu-HU" smtClean="0"/>
+              <a:rPr lang="hu-HU"/>
               <a:t>Negyedik szint</a:t>
             </a:r>
           </a:p>
           <a:p>
             <a:pPr lvl="4"/>
             <a:r>
-              <a:rPr lang="hu-HU" smtClean="0"/>
+              <a:rPr lang="hu-HU"/>
               <a:t>Ötödik szint</a:t>
             </a:r>
-            <a:endParaRPr lang="hu-HU"/>
           </a:p>
         </p:txBody>
       </p:sp>
@@ -1198,38 +1188,37 @@
           <a:p>
             <a:pPr lvl="0"/>
             <a:r>
-              <a:rPr lang="hu-HU" smtClean="0"/>
+              <a:rPr lang="hu-HU"/>
               <a:t>Mintaszöveg szerkesztése</a:t>
             </a:r>
           </a:p>
           <a:p>
             <a:pPr lvl="1"/>
             <a:r>
-              <a:rPr lang="hu-HU" smtClean="0"/>
+              <a:rPr lang="hu-HU"/>
               <a:t>Második szint</a:t>
             </a:r>
           </a:p>
           <a:p>
             <a:pPr lvl="2"/>
             <a:r>
-              <a:rPr lang="hu-HU" smtClean="0"/>
+              <a:rPr lang="hu-HU"/>
               <a:t>Harmadik szint</a:t>
             </a:r>
           </a:p>
           <a:p>
             <a:pPr lvl="3"/>
             <a:r>
-              <a:rPr lang="hu-HU" smtClean="0"/>
+              <a:rPr lang="hu-HU"/>
               <a:t>Negyedik szint</a:t>
             </a:r>
           </a:p>
           <a:p>
             <a:pPr lvl="4"/>
             <a:r>
-              <a:rPr lang="hu-HU" smtClean="0"/>
+              <a:rPr lang="hu-HU"/>
               <a:t>Ötödik szint</a:t>
             </a:r>
-            <a:endParaRPr lang="hu-HU"/>
           </a:p>
         </p:txBody>
       </p:sp>
@@ -1349,10 +1338,9 @@
           <a:lstStyle/>
           <a:p>
             <a:r>
-              <a:rPr lang="hu-HU" smtClean="0"/>
+              <a:rPr lang="hu-HU"/>
               <a:t>Mintacím szerkesztése</a:t>
             </a:r>
-            <a:endParaRPr lang="hu-HU"/>
           </a:p>
         </p:txBody>
       </p:sp>
@@ -1415,7 +1403,7 @@
           <a:p>
             <a:pPr lvl="0"/>
             <a:r>
-              <a:rPr lang="hu-HU" smtClean="0"/>
+              <a:rPr lang="hu-HU"/>
               <a:t>Mintaszöveg szerkesztése</a:t>
             </a:r>
           </a:p>
@@ -1443,38 +1431,37 @@
           <a:p>
             <a:pPr lvl="0"/>
             <a:r>
-              <a:rPr lang="hu-HU" smtClean="0"/>
+              <a:rPr lang="hu-HU"/>
               <a:t>Mintaszöveg szerkesztése</a:t>
             </a:r>
           </a:p>
           <a:p>
             <a:pPr lvl="1"/>
             <a:r>
-              <a:rPr lang="hu-HU" smtClean="0"/>
+              <a:rPr lang="hu-HU"/>
               <a:t>Második szint</a:t>
             </a:r>
           </a:p>
           <a:p>
             <a:pPr lvl="2"/>
             <a:r>
-              <a:rPr lang="hu-HU" smtClean="0"/>
+              <a:rPr lang="hu-HU"/>
               <a:t>Harmadik szint</a:t>
             </a:r>
           </a:p>
           <a:p>
             <a:pPr lvl="3"/>
             <a:r>
-              <a:rPr lang="hu-HU" smtClean="0"/>
+              <a:rPr lang="hu-HU"/>
               <a:t>Negyedik szint</a:t>
             </a:r>
           </a:p>
           <a:p>
             <a:pPr lvl="4"/>
             <a:r>
-              <a:rPr lang="hu-HU" smtClean="0"/>
+              <a:rPr lang="hu-HU"/>
               <a:t>Ötödik szint</a:t>
             </a:r>
-            <a:endParaRPr lang="hu-HU"/>
           </a:p>
         </p:txBody>
       </p:sp>
@@ -1537,7 +1524,7 @@
           <a:p>
             <a:pPr lvl="0"/>
             <a:r>
-              <a:rPr lang="hu-HU" smtClean="0"/>
+              <a:rPr lang="hu-HU"/>
               <a:t>Mintaszöveg szerkesztése</a:t>
             </a:r>
           </a:p>
@@ -1565,38 +1552,37 @@
           <a:p>
             <a:pPr lvl="0"/>
             <a:r>
-              <a:rPr lang="hu-HU" smtClean="0"/>
+              <a:rPr lang="hu-HU"/>
               <a:t>Mintaszöveg szerkesztése</a:t>
             </a:r>
           </a:p>
           <a:p>
             <a:pPr lvl="1"/>
             <a:r>
-              <a:rPr lang="hu-HU" smtClean="0"/>
+              <a:rPr lang="hu-HU"/>
               <a:t>Második szint</a:t>
             </a:r>
           </a:p>
           <a:p>
             <a:pPr lvl="2"/>
             <a:r>
-              <a:rPr lang="hu-HU" smtClean="0"/>
+              <a:rPr lang="hu-HU"/>
               <a:t>Harmadik szint</a:t>
             </a:r>
           </a:p>
           <a:p>
             <a:pPr lvl="3"/>
             <a:r>
-              <a:rPr lang="hu-HU" smtClean="0"/>
+              <a:rPr lang="hu-HU"/>
               <a:t>Negyedik szint</a:t>
             </a:r>
           </a:p>
           <a:p>
             <a:pPr lvl="4"/>
             <a:r>
-              <a:rPr lang="hu-HU" smtClean="0"/>
+              <a:rPr lang="hu-HU"/>
               <a:t>Ötödik szint</a:t>
             </a:r>
-            <a:endParaRPr lang="hu-HU"/>
           </a:p>
         </p:txBody>
       </p:sp>
@@ -1711,10 +1697,9 @@
           <a:lstStyle/>
           <a:p>
             <a:r>
-              <a:rPr lang="hu-HU" smtClean="0"/>
+              <a:rPr lang="hu-HU"/>
               <a:t>Mintacím szerkesztése</a:t>
             </a:r>
-            <a:endParaRPr lang="hu-HU"/>
           </a:p>
         </p:txBody>
       </p:sp>
@@ -1933,10 +1918,9 @@
           </a:lstStyle>
           <a:p>
             <a:r>
-              <a:rPr lang="hu-HU" smtClean="0"/>
+              <a:rPr lang="hu-HU"/>
               <a:t>Mintacím szerkesztése</a:t>
             </a:r>
-            <a:endParaRPr lang="hu-HU"/>
           </a:p>
         </p:txBody>
       </p:sp>
@@ -1990,38 +1974,37 @@
           <a:p>
             <a:pPr lvl="0"/>
             <a:r>
-              <a:rPr lang="hu-HU" smtClean="0"/>
+              <a:rPr lang="hu-HU"/>
               <a:t>Mintaszöveg szerkesztése</a:t>
             </a:r>
           </a:p>
           <a:p>
             <a:pPr lvl="1"/>
             <a:r>
-              <a:rPr lang="hu-HU" smtClean="0"/>
+              <a:rPr lang="hu-HU"/>
               <a:t>Második szint</a:t>
             </a:r>
           </a:p>
           <a:p>
             <a:pPr lvl="2"/>
             <a:r>
-              <a:rPr lang="hu-HU" smtClean="0"/>
+              <a:rPr lang="hu-HU"/>
               <a:t>Harmadik szint</a:t>
             </a:r>
           </a:p>
           <a:p>
             <a:pPr lvl="3"/>
             <a:r>
-              <a:rPr lang="hu-HU" smtClean="0"/>
+              <a:rPr lang="hu-HU"/>
               <a:t>Negyedik szint</a:t>
             </a:r>
           </a:p>
           <a:p>
             <a:pPr lvl="4"/>
             <a:r>
-              <a:rPr lang="hu-HU" smtClean="0"/>
+              <a:rPr lang="hu-HU"/>
               <a:t>Ötödik szint</a:t>
             </a:r>
-            <a:endParaRPr lang="hu-HU"/>
           </a:p>
         </p:txBody>
       </p:sp>
@@ -2084,7 +2067,7 @@
           <a:p>
             <a:pPr lvl="0"/>
             <a:r>
-              <a:rPr lang="hu-HU" smtClean="0"/>
+              <a:rPr lang="hu-HU"/>
               <a:t>Mintaszöveg szerkesztése</a:t>
             </a:r>
           </a:p>
@@ -2210,10 +2193,9 @@
           </a:lstStyle>
           <a:p>
             <a:r>
-              <a:rPr lang="hu-HU" smtClean="0"/>
+              <a:rPr lang="hu-HU"/>
               <a:t>Mintacím szerkesztése</a:t>
             </a:r>
-            <a:endParaRPr lang="hu-HU"/>
           </a:p>
         </p:txBody>
       </p:sp>
@@ -2337,7 +2319,7 @@
           <a:p>
             <a:pPr lvl="0"/>
             <a:r>
-              <a:rPr lang="hu-HU" smtClean="0"/>
+              <a:rPr lang="hu-HU"/>
               <a:t>Mintaszöveg szerkesztése</a:t>
             </a:r>
           </a:p>
@@ -2469,10 +2451,9 @@
           <a:lstStyle/>
           <a:p>
             <a:r>
-              <a:rPr lang="hu-HU" smtClean="0"/>
+              <a:rPr lang="hu-HU"/>
               <a:t>Mintacím szerkesztése</a:t>
             </a:r>
-            <a:endParaRPr lang="hu-HU"/>
           </a:p>
         </p:txBody>
       </p:sp>
@@ -2503,38 +2484,37 @@
           <a:p>
             <a:pPr lvl="0"/>
             <a:r>
-              <a:rPr lang="hu-HU" smtClean="0"/>
+              <a:rPr lang="hu-HU"/>
               <a:t>Mintaszöveg szerkesztése</a:t>
             </a:r>
           </a:p>
           <a:p>
             <a:pPr lvl="1"/>
             <a:r>
-              <a:rPr lang="hu-HU" smtClean="0"/>
+              <a:rPr lang="hu-HU"/>
               <a:t>Második szint</a:t>
             </a:r>
           </a:p>
           <a:p>
             <a:pPr lvl="2"/>
             <a:r>
-              <a:rPr lang="hu-HU" smtClean="0"/>
+              <a:rPr lang="hu-HU"/>
               <a:t>Harmadik szint</a:t>
             </a:r>
           </a:p>
           <a:p>
             <a:pPr lvl="3"/>
             <a:r>
-              <a:rPr lang="hu-HU" smtClean="0"/>
+              <a:rPr lang="hu-HU"/>
               <a:t>Negyedik szint</a:t>
             </a:r>
           </a:p>
           <a:p>
             <a:pPr lvl="4"/>
             <a:r>
-              <a:rPr lang="hu-HU" smtClean="0"/>
+              <a:rPr lang="hu-HU"/>
               <a:t>Ötödik szint</a:t>
             </a:r>
-            <a:endParaRPr lang="hu-HU"/>
           </a:p>
         </p:txBody>
       </p:sp>
@@ -3065,7 +3045,7 @@
           </a:p>
           <a:p>
             <a:r>
-              <a:rPr lang="hu-HU" b="1" dirty="0" smtClean="0">
+              <a:rPr lang="hu-HU" b="1" dirty="0">
                 <a:latin typeface="Times New Roman" panose="02020603050405020304" pitchFamily="18" charset="0"/>
                 <a:cs typeface="Times New Roman" panose="02020603050405020304" pitchFamily="18" charset="0"/>
               </a:rPr>
@@ -3081,18 +3061,11 @@
               <a:t>Cím: </a:t>
             </a:r>
             <a:r>
-              <a:rPr lang="hu-HU" dirty="0" smtClean="0">
-                <a:latin typeface="Times New Roman" panose="02020603050405020304" pitchFamily="18" charset="0"/>
-                <a:cs typeface="Times New Roman" panose="02020603050405020304" pitchFamily="18" charset="0"/>
-              </a:rPr>
-              <a:t>BKR </a:t>
-            </a:r>
-            <a:r>
               <a:rPr lang="hu-HU" dirty="0">
                 <a:latin typeface="Times New Roman" panose="02020603050405020304" pitchFamily="18" charset="0"/>
                 <a:cs typeface="Times New Roman" panose="02020603050405020304" pitchFamily="18" charset="0"/>
               </a:rPr>
-              <a:t>Alkatrész</a:t>
+              <a:t>BKR Alkatrész</a:t>
             </a:r>
             <a:endParaRPr lang="hu-HU" b="1" dirty="0">
               <a:latin typeface="Times New Roman" panose="02020603050405020304" pitchFamily="18" charset="0"/>
@@ -3105,35 +3078,14 @@
                 <a:latin typeface="Times New Roman" panose="02020603050405020304" pitchFamily="18" charset="0"/>
                 <a:cs typeface="Times New Roman" panose="02020603050405020304" pitchFamily="18" charset="0"/>
               </a:rPr>
-              <a:t>Készítette: </a:t>
-            </a:r>
-            <a:r>
-              <a:rPr lang="hu-HU" b="1" dirty="0" smtClean="0">
-                <a:latin typeface="Times New Roman" panose="02020603050405020304" pitchFamily="18" charset="0"/>
-                <a:cs typeface="Times New Roman" panose="02020603050405020304" pitchFamily="18" charset="0"/>
-              </a:rPr>
-              <a:t> </a:t>
-            </a:r>
-            <a:r>
-              <a:rPr lang="hu-HU" dirty="0" smtClean="0">
-                <a:latin typeface="Times New Roman" panose="02020603050405020304" pitchFamily="18" charset="0"/>
-                <a:cs typeface="Times New Roman" panose="02020603050405020304" pitchFamily="18" charset="0"/>
-              </a:rPr>
-              <a:t>Benedek Krisztián Billinger </a:t>
+              <a:t>Készítette:  </a:t>
             </a:r>
             <a:r>
               <a:rPr lang="hu-HU" dirty="0">
                 <a:latin typeface="Times New Roman" panose="02020603050405020304" pitchFamily="18" charset="0"/>
                 <a:cs typeface="Times New Roman" panose="02020603050405020304" pitchFamily="18" charset="0"/>
               </a:rPr>
-              <a:t>Benjámin </a:t>
-            </a:r>
-            <a:r>
-              <a:rPr lang="hu-HU" dirty="0" smtClean="0">
-                <a:latin typeface="Times New Roman" panose="02020603050405020304" pitchFamily="18" charset="0"/>
-                <a:cs typeface="Times New Roman" panose="02020603050405020304" pitchFamily="18" charset="0"/>
-              </a:rPr>
-              <a:t>Zsolt Petrik Rajmund Gábor</a:t>
+              <a:t>Benedek Krisztián Billinger Benjámin Zsolt Petrik Rajmund Gábor</a:t>
             </a:r>
             <a:endParaRPr lang="hu-HU" b="1" dirty="0">
               <a:latin typeface="Times New Roman" panose="02020603050405020304" pitchFamily="18" charset="0"/>
@@ -3241,6 +3193,160 @@
             <p:ph type="title"/>
           </p:nvPr>
         </p:nvSpPr>
+        <p:spPr/>
+        <p:txBody>
+          <a:bodyPr/>
+          <a:lstStyle/>
+          <a:p>
+            <a:r>
+              <a:rPr lang="hu-HU" dirty="0">
+                <a:latin typeface="Times New Roman" panose="02020603050405020304" pitchFamily="18" charset="0"/>
+                <a:cs typeface="Times New Roman" panose="02020603050405020304" pitchFamily="18" charset="0"/>
+              </a:rPr>
+              <a:t>Clubtagság bemutatása</a:t>
+            </a:r>
+          </a:p>
+        </p:txBody>
+      </p:sp>
+      <p:pic>
+        <p:nvPicPr>
+          <p:cNvPr id="5" name="Kép 4"/>
+          <p:cNvPicPr/>
+          <p:nvPr/>
+        </p:nvPicPr>
+        <p:blipFill>
+          <a:blip r:embed="rId2"/>
+          <a:stretch>
+            <a:fillRect/>
+          </a:stretch>
+        </p:blipFill>
+        <p:spPr>
+          <a:xfrm>
+            <a:off x="838200" y="1690688"/>
+            <a:ext cx="2531745" cy="4876800"/>
+          </a:xfrm>
+          <a:prstGeom prst="rect">
+            <a:avLst/>
+          </a:prstGeom>
+          <a:ln>
+            <a:noFill/>
+          </a:ln>
+          <a:effectLst>
+            <a:outerShdw blurRad="292100" dist="139700" dir="2700000" algn="tl" rotWithShape="0">
+              <a:srgbClr val="333333">
+                <a:alpha val="65000"/>
+              </a:srgbClr>
+            </a:outerShdw>
+          </a:effectLst>
+        </p:spPr>
+      </p:pic>
+      <p:pic>
+        <p:nvPicPr>
+          <p:cNvPr id="6" name="Kép 5"/>
+          <p:cNvPicPr/>
+          <p:nvPr/>
+        </p:nvPicPr>
+        <p:blipFill>
+          <a:blip r:embed="rId3"/>
+          <a:stretch>
+            <a:fillRect/>
+          </a:stretch>
+        </p:blipFill>
+        <p:spPr>
+          <a:xfrm>
+            <a:off x="5140804" y="2268658"/>
+            <a:ext cx="4960692" cy="1716746"/>
+          </a:xfrm>
+          <a:prstGeom prst="rect">
+            <a:avLst/>
+          </a:prstGeom>
+          <a:ln>
+            <a:noFill/>
+          </a:ln>
+          <a:effectLst>
+            <a:outerShdw blurRad="292100" dist="139700" dir="2700000" algn="tl" rotWithShape="0">
+              <a:srgbClr val="333333">
+                <a:alpha val="65000"/>
+              </a:srgbClr>
+            </a:outerShdw>
+          </a:effectLst>
+        </p:spPr>
+      </p:pic>
+      <p:pic>
+        <p:nvPicPr>
+          <p:cNvPr id="7" name="Kép 6"/>
+          <p:cNvPicPr/>
+          <p:nvPr/>
+        </p:nvPicPr>
+        <p:blipFill>
+          <a:blip r:embed="rId4"/>
+          <a:stretch>
+            <a:fillRect/>
+          </a:stretch>
+        </p:blipFill>
+        <p:spPr>
+          <a:xfrm>
+            <a:off x="3888500" y="4822165"/>
+            <a:ext cx="7465300" cy="675197"/>
+          </a:xfrm>
+          <a:prstGeom prst="rect">
+            <a:avLst/>
+          </a:prstGeom>
+          <a:ln>
+            <a:noFill/>
+          </a:ln>
+          <a:effectLst>
+            <a:outerShdw blurRad="292100" dist="139700" dir="2700000" algn="tl" rotWithShape="0">
+              <a:srgbClr val="333333">
+                <a:alpha val="65000"/>
+              </a:srgbClr>
+            </a:outerShdw>
+          </a:effectLst>
+        </p:spPr>
+      </p:pic>
+    </p:spTree>
+    <p:extLst>
+      <p:ext uri="{BB962C8B-B14F-4D97-AF65-F5344CB8AC3E}">
+        <p14:creationId xmlns:p14="http://schemas.microsoft.com/office/powerpoint/2010/main" val="1232202109"/>
+      </p:ext>
+    </p:extLst>
+  </p:cSld>
+  <p:clrMapOvr>
+    <a:masterClrMapping/>
+  </p:clrMapOvr>
+  <p:transition spd="med">
+    <p:pull/>
+  </p:transition>
+</p:sld>
+</file>
+
+<file path=ppt/slides/slide11.xml><?xml version="1.0" encoding="utf-8"?>
+<p:sld xmlns:a="http://schemas.openxmlformats.org/drawingml/2006/main" xmlns:r="http://schemas.openxmlformats.org/officeDocument/2006/relationships" xmlns:p="http://schemas.openxmlformats.org/presentationml/2006/main">
+  <p:cSld>
+    <p:spTree>
+      <p:nvGrpSpPr>
+        <p:cNvPr id="1" name=""/>
+        <p:cNvGrpSpPr/>
+        <p:nvPr/>
+      </p:nvGrpSpPr>
+      <p:grpSpPr>
+        <a:xfrm>
+          <a:off x="0" y="0"/>
+          <a:ext cx="0" cy="0"/>
+          <a:chOff x="0" y="0"/>
+          <a:chExt cx="0" cy="0"/>
+        </a:xfrm>
+      </p:grpSpPr>
+      <p:sp>
+        <p:nvSpPr>
+          <p:cNvPr id="2" name="Cím 1"/>
+          <p:cNvSpPr>
+            <a:spLocks noGrp="1"/>
+          </p:cNvSpPr>
+          <p:nvPr>
+            <p:ph type="title"/>
+          </p:nvPr>
+        </p:nvSpPr>
         <p:spPr>
           <a:xfrm>
             <a:off x="0" y="0"/>
@@ -3253,16 +3359,12 @@
           <a:p>
             <a:pPr algn="ctr"/>
             <a:r>
-              <a:rPr lang="hu-HU" dirty="0" smtClean="0">
+              <a:rPr lang="hu-HU" dirty="0">
                 <a:latin typeface="Times New Roman" panose="02020603050405020304" pitchFamily="18" charset="0"/>
                 <a:cs typeface="Times New Roman" panose="02020603050405020304" pitchFamily="18" charset="0"/>
               </a:rPr>
               <a:t>Köszönjük a figyelmet!</a:t>
             </a:r>
-            <a:endParaRPr lang="hu-HU" dirty="0">
-              <a:latin typeface="Times New Roman" panose="02020603050405020304" pitchFamily="18" charset="0"/>
-              <a:cs typeface="Times New Roman" panose="02020603050405020304" pitchFamily="18" charset="0"/>
-            </a:endParaRPr>
           </a:p>
         </p:txBody>
       </p:sp>
@@ -3276,6 +3378,9 @@
   <p:clrMapOvr>
     <a:masterClrMapping/>
   </p:clrMapOvr>
+  <p:transition spd="med">
+    <p:pull/>
+  </p:transition>
 </p:sld>
 </file>
 
@@ -3313,16 +3418,12 @@
           <a:p>
             <a:pPr algn="ctr"/>
             <a:r>
-              <a:rPr lang="hu-HU" dirty="0" smtClean="0">
+              <a:rPr lang="hu-HU" dirty="0">
                 <a:latin typeface="Times New Roman" panose="02020603050405020304" pitchFamily="18" charset="0"/>
                 <a:cs typeface="Times New Roman" panose="02020603050405020304" pitchFamily="18" charset="0"/>
               </a:rPr>
               <a:t>Adatmodell</a:t>
             </a:r>
-            <a:endParaRPr lang="hu-HU" dirty="0">
-              <a:latin typeface="Times New Roman" panose="02020603050405020304" pitchFamily="18" charset="0"/>
-              <a:cs typeface="Times New Roman" panose="02020603050405020304" pitchFamily="18" charset="0"/>
-            </a:endParaRPr>
           </a:p>
         </p:txBody>
       </p:sp>
@@ -3362,6 +3463,9 @@
   <p:clrMapOvr>
     <a:masterClrMapping/>
   </p:clrMapOvr>
+  <p:transition spd="med">
+    <p:pull/>
+  </p:transition>
 </p:sld>
 </file>
 
@@ -3398,16 +3502,12 @@
           <a:lstStyle/>
           <a:p>
             <a:r>
-              <a:rPr lang="hu-HU" dirty="0" smtClean="0">
+              <a:rPr lang="hu-HU" dirty="0">
                 <a:latin typeface="Times New Roman" panose="02020603050405020304" pitchFamily="18" charset="0"/>
                 <a:cs typeface="Times New Roman" panose="02020603050405020304" pitchFamily="18" charset="0"/>
               </a:rPr>
               <a:t>Specifikáció</a:t>
             </a:r>
-            <a:endParaRPr lang="hu-HU" dirty="0">
-              <a:latin typeface="Times New Roman" panose="02020603050405020304" pitchFamily="18" charset="0"/>
-              <a:cs typeface="Times New Roman" panose="02020603050405020304" pitchFamily="18" charset="0"/>
-            </a:endParaRPr>
           </a:p>
         </p:txBody>
       </p:sp>
@@ -3432,7 +3532,7 @@
               <a:buNone/>
             </a:pPr>
             <a:r>
-              <a:rPr lang="hu-HU" b="1" dirty="0" smtClean="0">
+              <a:rPr lang="hu-HU" b="1" dirty="0">
                 <a:latin typeface="Times New Roman" panose="02020603050405020304" pitchFamily="18" charset="0"/>
                 <a:cs typeface="Times New Roman" panose="02020603050405020304" pitchFamily="18" charset="0"/>
               </a:rPr>
@@ -3444,7 +3544,7 @@
               <a:buNone/>
             </a:pPr>
             <a:r>
-              <a:rPr lang="hu-HU" b="1" dirty="0" smtClean="0">
+              <a:rPr lang="hu-HU" b="1" dirty="0">
                 <a:latin typeface="Times New Roman" panose="02020603050405020304" pitchFamily="18" charset="0"/>
                 <a:cs typeface="Times New Roman" panose="02020603050405020304" pitchFamily="18" charset="0"/>
               </a:rPr>
@@ -3456,7 +3556,7 @@
               <a:buNone/>
             </a:pPr>
             <a:r>
-              <a:rPr lang="hu-HU" dirty="0" smtClean="0">
+              <a:rPr lang="hu-HU" dirty="0">
                 <a:latin typeface="Times New Roman" panose="02020603050405020304" pitchFamily="18" charset="0"/>
                 <a:cs typeface="Times New Roman" panose="02020603050405020304" pitchFamily="18" charset="0"/>
               </a:rPr>
@@ -3468,7 +3568,7 @@
               <a:buNone/>
             </a:pPr>
             <a:r>
-              <a:rPr lang="hu-HU" b="1" dirty="0" smtClean="0">
+              <a:rPr lang="hu-HU" b="1" dirty="0">
                 <a:latin typeface="Times New Roman" panose="02020603050405020304" pitchFamily="18" charset="0"/>
                 <a:cs typeface="Times New Roman" panose="02020603050405020304" pitchFamily="18" charset="0"/>
               </a:rPr>
@@ -3480,7 +3580,7 @@
               <a:buNone/>
             </a:pPr>
             <a:r>
-              <a:rPr lang="hu-HU" b="1" dirty="0" smtClean="0">
+              <a:rPr lang="hu-HU" b="1" dirty="0">
                 <a:latin typeface="Times New Roman" panose="02020603050405020304" pitchFamily="18" charset="0"/>
                 <a:cs typeface="Times New Roman" panose="02020603050405020304" pitchFamily="18" charset="0"/>
               </a:rPr>
@@ -3492,7 +3592,7 @@
               <a:buNone/>
             </a:pPr>
             <a:r>
-              <a:rPr lang="hu-HU" b="1" dirty="0" smtClean="0">
+              <a:rPr lang="hu-HU" b="1" dirty="0">
                 <a:latin typeface="Times New Roman" panose="02020603050405020304" pitchFamily="18" charset="0"/>
                 <a:cs typeface="Times New Roman" panose="02020603050405020304" pitchFamily="18" charset="0"/>
               </a:rPr>
@@ -3504,7 +3604,7 @@
               <a:buNone/>
             </a:pPr>
             <a:r>
-              <a:rPr lang="hu-HU" dirty="0" smtClean="0">
+              <a:rPr lang="hu-HU" dirty="0">
                 <a:latin typeface="Times New Roman" panose="02020603050405020304" pitchFamily="18" charset="0"/>
                 <a:cs typeface="Times New Roman" panose="02020603050405020304" pitchFamily="18" charset="0"/>
               </a:rPr>
@@ -3516,7 +3616,7 @@
               <a:buNone/>
             </a:pPr>
             <a:r>
-              <a:rPr lang="hu-HU" b="1" dirty="0" smtClean="0">
+              <a:rPr lang="hu-HU" b="1" dirty="0">
                 <a:latin typeface="Times New Roman" panose="02020603050405020304" pitchFamily="18" charset="0"/>
                 <a:cs typeface="Times New Roman" panose="02020603050405020304" pitchFamily="18" charset="0"/>
               </a:rPr>
@@ -3528,7 +3628,7 @@
               <a:buNone/>
             </a:pPr>
             <a:r>
-              <a:rPr lang="hu-HU" b="1" dirty="0" smtClean="0">
+              <a:rPr lang="hu-HU" b="1" dirty="0">
                 <a:latin typeface="Times New Roman" panose="02020603050405020304" pitchFamily="18" charset="0"/>
                 <a:cs typeface="Times New Roman" panose="02020603050405020304" pitchFamily="18" charset="0"/>
               </a:rPr>
@@ -3540,7 +3640,7 @@
               <a:buNone/>
             </a:pPr>
             <a:r>
-              <a:rPr lang="hu-HU" b="1" dirty="0" smtClean="0">
+              <a:rPr lang="hu-HU" b="1" dirty="0">
                 <a:latin typeface="Times New Roman" panose="02020603050405020304" pitchFamily="18" charset="0"/>
                 <a:cs typeface="Times New Roman" panose="02020603050405020304" pitchFamily="18" charset="0"/>
               </a:rPr>
@@ -3552,23 +3652,19 @@
               <a:buNone/>
             </a:pPr>
             <a:r>
-              <a:rPr lang="hu-HU" b="1" dirty="0" err="1" smtClean="0">
+              <a:rPr lang="hu-HU" b="1" dirty="0" err="1">
                 <a:latin typeface="Times New Roman" panose="02020603050405020304" pitchFamily="18" charset="0"/>
                 <a:cs typeface="Times New Roman" panose="02020603050405020304" pitchFamily="18" charset="0"/>
               </a:rPr>
               <a:t>MySQL</a:t>
             </a:r>
             <a:r>
-              <a:rPr lang="hu-HU" b="1" dirty="0" smtClean="0">
+              <a:rPr lang="hu-HU" b="1" dirty="0">
                 <a:latin typeface="Times New Roman" panose="02020603050405020304" pitchFamily="18" charset="0"/>
                 <a:cs typeface="Times New Roman" panose="02020603050405020304" pitchFamily="18" charset="0"/>
               </a:rPr>
               <a:t> adatbázis (XAMPP)</a:t>
             </a:r>
-            <a:endParaRPr lang="hu-HU" b="1" dirty="0">
-              <a:latin typeface="Times New Roman" panose="02020603050405020304" pitchFamily="18" charset="0"/>
-              <a:cs typeface="Times New Roman" panose="02020603050405020304" pitchFamily="18" charset="0"/>
-            </a:endParaRPr>
           </a:p>
         </p:txBody>
       </p:sp>
@@ -3582,6 +3678,9 @@
   <p:clrMapOvr>
     <a:masterClrMapping/>
   </p:clrMapOvr>
+  <p:transition spd="med">
+    <p:pull/>
+  </p:transition>
 </p:sld>
 </file>
 
@@ -3618,16 +3717,12 @@
           <a:lstStyle/>
           <a:p>
             <a:r>
-              <a:rPr lang="hu-HU" dirty="0" smtClean="0">
+              <a:rPr lang="hu-HU" dirty="0">
                 <a:latin typeface="Times New Roman" panose="02020603050405020304" pitchFamily="18" charset="0"/>
                 <a:cs typeface="Times New Roman" panose="02020603050405020304" pitchFamily="18" charset="0"/>
               </a:rPr>
               <a:t>Regisztráció bemutatása</a:t>
             </a:r>
-            <a:endParaRPr lang="hu-HU" dirty="0">
-              <a:latin typeface="Times New Roman" panose="02020603050405020304" pitchFamily="18" charset="0"/>
-              <a:cs typeface="Times New Roman" panose="02020603050405020304" pitchFamily="18" charset="0"/>
-            </a:endParaRPr>
           </a:p>
         </p:txBody>
       </p:sp>
@@ -3737,13 +3832,9 @@
   <p:clrMapOvr>
     <a:masterClrMapping/>
   </p:clrMapOvr>
-  <p:timing>
-    <p:tnLst>
-      <p:par>
-        <p:cTn id="1" dur="indefinite" restart="never" nodeType="tmRoot"/>
-      </p:par>
-    </p:tnLst>
-  </p:timing>
+  <p:transition spd="med">
+    <p:pull/>
+  </p:transition>
 </p:sld>
 </file>
 
@@ -3780,38 +3871,134 @@
           <a:lstStyle/>
           <a:p>
             <a:r>
-              <a:rPr lang="hu-HU" dirty="0" smtClean="0">
+              <a:rPr lang="hu-HU" dirty="0">
                 <a:latin typeface="Times New Roman" panose="02020603050405020304" pitchFamily="18" charset="0"/>
                 <a:cs typeface="Times New Roman" panose="02020603050405020304" pitchFamily="18" charset="0"/>
               </a:rPr>
               <a:t>Bejelentkezés bemutatása</a:t>
             </a:r>
-            <a:endParaRPr lang="hu-HU" dirty="0">
-              <a:latin typeface="Times New Roman" panose="02020603050405020304" pitchFamily="18" charset="0"/>
-              <a:cs typeface="Times New Roman" panose="02020603050405020304" pitchFamily="18" charset="0"/>
-            </a:endParaRPr>
-          </a:p>
-        </p:txBody>
-      </p:sp>
-      <p:sp>
-        <p:nvSpPr>
-          <p:cNvPr id="3" name="Tartalom helye 2"/>
-          <p:cNvSpPr>
-            <a:spLocks noGrp="1"/>
-          </p:cNvSpPr>
+          </a:p>
+        </p:txBody>
+      </p:sp>
+      <p:pic>
+        <p:nvPicPr>
+          <p:cNvPr id="4" name="image32.png">
+            <a:extLst>
+              <a:ext uri="{FF2B5EF4-FFF2-40B4-BE49-F238E27FC236}">
+                <a16:creationId xmlns:a16="http://schemas.microsoft.com/office/drawing/2014/main" id="{075B43D6-6C04-90E2-CE77-0D293A3E6C26}"/>
+              </a:ext>
+            </a:extLst>
+          </p:cNvPr>
+          <p:cNvPicPr>
+            <a:picLocks noGrp="1"/>
+          </p:cNvPicPr>
           <p:nvPr>
             <p:ph idx="1"/>
           </p:nvPr>
-        </p:nvSpPr>
-        <p:spPr/>
-        <p:txBody>
-          <a:bodyPr/>
-          <a:lstStyle/>
-          <a:p>
-            <a:endParaRPr lang="hu-HU"/>
-          </a:p>
-        </p:txBody>
-      </p:sp>
+        </p:nvPicPr>
+        <p:blipFill>
+          <a:blip r:embed="rId2"/>
+          <a:srcRect/>
+          <a:stretch>
+            <a:fillRect/>
+          </a:stretch>
+        </p:blipFill>
+        <p:spPr>
+          <a:xfrm>
+            <a:off x="907546" y="3382962"/>
+            <a:ext cx="3331789" cy="3015615"/>
+          </a:xfrm>
+          <a:prstGeom prst="rect">
+            <a:avLst/>
+          </a:prstGeom>
+          <a:ln/>
+          <a:effectLst>
+            <a:outerShdw blurRad="50800" dist="38100" dir="2700000" algn="tl" rotWithShape="0">
+              <a:prstClr val="black">
+                <a:alpha val="40000"/>
+              </a:prstClr>
+            </a:outerShdw>
+          </a:effectLst>
+        </p:spPr>
+      </p:pic>
+      <p:pic>
+        <p:nvPicPr>
+          <p:cNvPr id="5" name="image16.png">
+            <a:extLst>
+              <a:ext uri="{FF2B5EF4-FFF2-40B4-BE49-F238E27FC236}">
+                <a16:creationId xmlns:a16="http://schemas.microsoft.com/office/drawing/2014/main" id="{8294513E-969D-B61E-CB61-BCEC84EBE2FC}"/>
+              </a:ext>
+            </a:extLst>
+          </p:cNvPr>
+          <p:cNvPicPr/>
+          <p:nvPr/>
+        </p:nvPicPr>
+        <p:blipFill>
+          <a:blip r:embed="rId3">
+            <a:extLst>
+              <a:ext uri="{28A0092B-C50C-407E-A947-70E740481C1C}">
+                <a14:useLocalDpi xmlns:a14="http://schemas.microsoft.com/office/drawing/2010/main" val="0"/>
+              </a:ext>
+            </a:extLst>
+          </a:blip>
+          <a:srcRect/>
+          <a:stretch/>
+        </p:blipFill>
+        <p:spPr>
+          <a:xfrm>
+            <a:off x="5221684" y="4434840"/>
+            <a:ext cx="6132116" cy="1963737"/>
+          </a:xfrm>
+          <a:prstGeom prst="rect">
+            <a:avLst/>
+          </a:prstGeom>
+          <a:ln/>
+          <a:effectLst>
+            <a:outerShdw blurRad="50800" dist="38100" dir="2700000" algn="tl" rotWithShape="0">
+              <a:prstClr val="black">
+                <a:alpha val="40000"/>
+              </a:prstClr>
+            </a:outerShdw>
+          </a:effectLst>
+        </p:spPr>
+      </p:pic>
+      <p:pic>
+        <p:nvPicPr>
+          <p:cNvPr id="6" name="image23.png">
+            <a:extLst>
+              <a:ext uri="{FF2B5EF4-FFF2-40B4-BE49-F238E27FC236}">
+                <a16:creationId xmlns:a16="http://schemas.microsoft.com/office/drawing/2014/main" id="{4C548EF6-FB6B-DBE1-0F41-60AC33A18881}"/>
+              </a:ext>
+            </a:extLst>
+          </p:cNvPr>
+          <p:cNvPicPr/>
+          <p:nvPr/>
+        </p:nvPicPr>
+        <p:blipFill>
+          <a:blip r:embed="rId4"/>
+          <a:srcRect/>
+          <a:stretch>
+            <a:fillRect/>
+          </a:stretch>
+        </p:blipFill>
+        <p:spPr>
+          <a:xfrm>
+            <a:off x="1166467" y="1690688"/>
+            <a:ext cx="9859066" cy="487736"/>
+          </a:xfrm>
+          <a:prstGeom prst="rect">
+            <a:avLst/>
+          </a:prstGeom>
+          <a:ln/>
+          <a:effectLst>
+            <a:outerShdw blurRad="50800" dist="38100" dir="2700000" algn="tl" rotWithShape="0">
+              <a:prstClr val="black">
+                <a:alpha val="40000"/>
+              </a:prstClr>
+            </a:outerShdw>
+          </a:effectLst>
+        </p:spPr>
+      </p:pic>
     </p:spTree>
     <p:extLst>
       <p:ext uri="{BB962C8B-B14F-4D97-AF65-F5344CB8AC3E}">
@@ -3822,13 +4009,9 @@
   <p:clrMapOvr>
     <a:masterClrMapping/>
   </p:clrMapOvr>
-  <p:timing>
-    <p:tnLst>
-      <p:par>
-        <p:cTn id="1" dur="indefinite" restart="never" nodeType="tmRoot"/>
-      </p:par>
-    </p:tnLst>
-  </p:timing>
+  <p:transition spd="med">
+    <p:pull/>
+  </p:transition>
 </p:sld>
 </file>
 
@@ -3871,18 +4054,7 @@
                 <a:latin typeface="Times New Roman" panose="02020603050405020304" pitchFamily="18" charset="0"/>
                 <a:cs typeface="Times New Roman" panose="02020603050405020304" pitchFamily="18" charset="0"/>
               </a:rPr>
-              <a:t>Cikkszám alapján való keresés </a:t>
-            </a:r>
-            <a:r>
-              <a:rPr lang="hu-HU" dirty="0" smtClean="0">
-                <a:latin typeface="Times New Roman" panose="02020603050405020304" pitchFamily="18" charset="0"/>
-                <a:cs typeface="Times New Roman" panose="02020603050405020304" pitchFamily="18" charset="0"/>
-              </a:rPr>
-              <a:t>bemutatása</a:t>
-            </a:r>
-            <a:r>
-              <a:rPr lang="hu-HU" dirty="0"/>
-              <a:t/>
+              <a:t>Cikkszám alapján való keresés bemutatása</a:t>
             </a:r>
             <a:br>
               <a:rPr lang="hu-HU" dirty="0"/>
@@ -3965,13 +4137,9 @@
   <p:clrMapOvr>
     <a:masterClrMapping/>
   </p:clrMapOvr>
-  <p:timing>
-    <p:tnLst>
-      <p:par>
-        <p:cTn id="1" dur="indefinite" restart="never" nodeType="tmRoot"/>
-      </p:par>
-    </p:tnLst>
-  </p:timing>
+  <p:transition spd="med">
+    <p:pull/>
+  </p:transition>
 </p:sld>
 </file>
 
@@ -4007,29 +4175,168 @@
           <a:bodyPr/>
           <a:lstStyle/>
           <a:p>
-            <a:endParaRPr lang="hu-HU"/>
-          </a:p>
-        </p:txBody>
-      </p:sp>
-      <p:sp>
-        <p:nvSpPr>
-          <p:cNvPr id="3" name="Tartalom helye 2"/>
-          <p:cNvSpPr>
-            <a:spLocks noGrp="1"/>
-          </p:cNvSpPr>
+            <a:r>
+              <a:rPr lang="hu-HU" dirty="0">
+                <a:latin typeface="Times New Roman" panose="02020603050405020304" pitchFamily="18" charset="0"/>
+                <a:cs typeface="Times New Roman" panose="02020603050405020304" pitchFamily="18" charset="0"/>
+              </a:rPr>
+              <a:t>Webáruház bemutatása</a:t>
+            </a:r>
+          </a:p>
+        </p:txBody>
+      </p:sp>
+      <p:pic>
+        <p:nvPicPr>
+          <p:cNvPr id="4" name="image14.png">
+            <a:extLst>
+              <a:ext uri="{FF2B5EF4-FFF2-40B4-BE49-F238E27FC236}">
+                <a16:creationId xmlns:a16="http://schemas.microsoft.com/office/drawing/2014/main" id="{7274DFC1-420D-6A1B-099A-C585C4DEDF00}"/>
+              </a:ext>
+            </a:extLst>
+          </p:cNvPr>
+          <p:cNvPicPr>
+            <a:picLocks noGrp="1"/>
+          </p:cNvPicPr>
           <p:nvPr>
             <p:ph idx="1"/>
           </p:nvPr>
-        </p:nvSpPr>
-        <p:spPr/>
-        <p:txBody>
-          <a:bodyPr/>
-          <a:lstStyle/>
-          <a:p>
-            <a:endParaRPr lang="hu-HU"/>
-          </a:p>
-        </p:txBody>
-      </p:sp>
+        </p:nvPicPr>
+        <p:blipFill>
+          <a:blip r:embed="rId2"/>
+          <a:srcRect/>
+          <a:stretch>
+            <a:fillRect/>
+          </a:stretch>
+        </p:blipFill>
+        <p:spPr>
+          <a:xfrm>
+            <a:off x="0" y="1518071"/>
+            <a:ext cx="5257800" cy="2677411"/>
+          </a:xfrm>
+          <a:prstGeom prst="rect">
+            <a:avLst/>
+          </a:prstGeom>
+          <a:ln/>
+          <a:effectLst>
+            <a:outerShdw blurRad="50800" dist="38100" dir="2700000" algn="tl" rotWithShape="0">
+              <a:prstClr val="black">
+                <a:alpha val="40000"/>
+              </a:prstClr>
+            </a:outerShdw>
+          </a:effectLst>
+        </p:spPr>
+      </p:pic>
+      <p:pic>
+        <p:nvPicPr>
+          <p:cNvPr id="5" name="image59.png">
+            <a:extLst>
+              <a:ext uri="{FF2B5EF4-FFF2-40B4-BE49-F238E27FC236}">
+                <a16:creationId xmlns:a16="http://schemas.microsoft.com/office/drawing/2014/main" id="{33C36C05-E3C5-15C5-7CCE-3AF8FE9ED764}"/>
+              </a:ext>
+            </a:extLst>
+          </p:cNvPr>
+          <p:cNvPicPr/>
+          <p:nvPr/>
+        </p:nvPicPr>
+        <p:blipFill>
+          <a:blip r:embed="rId3"/>
+          <a:srcRect/>
+          <a:stretch>
+            <a:fillRect/>
+          </a:stretch>
+        </p:blipFill>
+        <p:spPr>
+          <a:xfrm>
+            <a:off x="139065" y="4187648"/>
+            <a:ext cx="5118735" cy="2321560"/>
+          </a:xfrm>
+          <a:prstGeom prst="rect">
+            <a:avLst/>
+          </a:prstGeom>
+          <a:ln/>
+          <a:effectLst>
+            <a:outerShdw blurRad="50800" dist="38100" dir="2700000" algn="tl" rotWithShape="0">
+              <a:prstClr val="black">
+                <a:alpha val="40000"/>
+              </a:prstClr>
+            </a:outerShdw>
+          </a:effectLst>
+        </p:spPr>
+      </p:pic>
+      <p:pic>
+        <p:nvPicPr>
+          <p:cNvPr id="6" name="image46.png">
+            <a:extLst>
+              <a:ext uri="{FF2B5EF4-FFF2-40B4-BE49-F238E27FC236}">
+                <a16:creationId xmlns:a16="http://schemas.microsoft.com/office/drawing/2014/main" id="{1C27D5A3-9D0C-59B2-6360-86CF4255CF7F}"/>
+              </a:ext>
+            </a:extLst>
+          </p:cNvPr>
+          <p:cNvPicPr/>
+          <p:nvPr/>
+        </p:nvPicPr>
+        <p:blipFill>
+          <a:blip r:embed="rId4"/>
+          <a:srcRect/>
+          <a:stretch>
+            <a:fillRect/>
+          </a:stretch>
+        </p:blipFill>
+        <p:spPr>
+          <a:xfrm>
+            <a:off x="6431280" y="1518071"/>
+            <a:ext cx="5760720" cy="2677411"/>
+          </a:xfrm>
+          <a:prstGeom prst="rect">
+            <a:avLst/>
+          </a:prstGeom>
+          <a:ln/>
+          <a:effectLst>
+            <a:outerShdw blurRad="50800" dist="38100" dir="2700000" algn="tl" rotWithShape="0">
+              <a:prstClr val="black">
+                <a:alpha val="40000"/>
+              </a:prstClr>
+            </a:outerShdw>
+          </a:effectLst>
+        </p:spPr>
+      </p:pic>
+      <p:pic>
+        <p:nvPicPr>
+          <p:cNvPr id="7" name="image56.png">
+            <a:extLst>
+              <a:ext uri="{FF2B5EF4-FFF2-40B4-BE49-F238E27FC236}">
+                <a16:creationId xmlns:a16="http://schemas.microsoft.com/office/drawing/2014/main" id="{AB8DA173-7F2B-AE20-55AB-CE41E154C5D8}"/>
+              </a:ext>
+            </a:extLst>
+          </p:cNvPr>
+          <p:cNvPicPr/>
+          <p:nvPr/>
+        </p:nvPicPr>
+        <p:blipFill>
+          <a:blip r:embed="rId5"/>
+          <a:srcRect/>
+          <a:stretch>
+            <a:fillRect/>
+          </a:stretch>
+        </p:blipFill>
+        <p:spPr>
+          <a:xfrm>
+            <a:off x="7345680" y="4766029"/>
+            <a:ext cx="3481070" cy="1180465"/>
+          </a:xfrm>
+          <a:prstGeom prst="rect">
+            <a:avLst/>
+          </a:prstGeom>
+          <a:ln/>
+          <a:effectLst>
+            <a:outerShdw blurRad="50800" dist="38100" dir="2700000" algn="tl" rotWithShape="0">
+              <a:prstClr val="black">
+                <a:alpha val="40000"/>
+              </a:prstClr>
+            </a:outerShdw>
+          </a:effectLst>
+        </p:spPr>
+      </p:pic>
     </p:spTree>
     <p:extLst>
       <p:ext uri="{BB962C8B-B14F-4D97-AF65-F5344CB8AC3E}">
@@ -4040,13 +4347,9 @@
   <p:clrMapOvr>
     <a:masterClrMapping/>
   </p:clrMapOvr>
-  <p:timing>
-    <p:tnLst>
-      <p:par>
-        <p:cTn id="1" dur="indefinite" restart="never" nodeType="tmRoot"/>
-      </p:par>
-    </p:tnLst>
-  </p:timing>
+  <p:transition spd="med">
+    <p:pull/>
+  </p:transition>
 </p:sld>
 </file>
 
@@ -4082,29 +4385,133 @@
           <a:bodyPr/>
           <a:lstStyle/>
           <a:p>
-            <a:endParaRPr lang="hu-HU"/>
-          </a:p>
-        </p:txBody>
-      </p:sp>
-      <p:sp>
-        <p:nvSpPr>
-          <p:cNvPr id="3" name="Tartalom helye 2"/>
-          <p:cNvSpPr>
-            <a:spLocks noGrp="1"/>
-          </p:cNvSpPr>
+            <a:r>
+              <a:rPr lang="hu-HU" dirty="0">
+                <a:latin typeface="Times New Roman" panose="02020603050405020304" pitchFamily="18" charset="0"/>
+                <a:cs typeface="Times New Roman" panose="02020603050405020304" pitchFamily="18" charset="0"/>
+              </a:rPr>
+              <a:t>Kosár bemutatása</a:t>
+            </a:r>
+          </a:p>
+        </p:txBody>
+      </p:sp>
+      <p:pic>
+        <p:nvPicPr>
+          <p:cNvPr id="4" name="image55.png">
+            <a:extLst>
+              <a:ext uri="{FF2B5EF4-FFF2-40B4-BE49-F238E27FC236}">
+                <a16:creationId xmlns:a16="http://schemas.microsoft.com/office/drawing/2014/main" id="{77EEB8BC-0CC7-F9C3-E2A3-DC44991A3356}"/>
+              </a:ext>
+            </a:extLst>
+          </p:cNvPr>
+          <p:cNvPicPr>
+            <a:picLocks noGrp="1" noChangeAspect="1"/>
+          </p:cNvPicPr>
           <p:nvPr>
             <p:ph idx="1"/>
           </p:nvPr>
-        </p:nvSpPr>
-        <p:spPr/>
-        <p:txBody>
-          <a:bodyPr/>
-          <a:lstStyle/>
-          <a:p>
-            <a:endParaRPr lang="hu-HU"/>
-          </a:p>
-        </p:txBody>
-      </p:sp>
+        </p:nvPicPr>
+        <p:blipFill>
+          <a:blip r:embed="rId2"/>
+          <a:srcRect/>
+          <a:stretch>
+            <a:fillRect/>
+          </a:stretch>
+        </p:blipFill>
+        <p:spPr>
+          <a:xfrm>
+            <a:off x="838200" y="1690688"/>
+            <a:ext cx="6734618" cy="2144878"/>
+          </a:xfrm>
+          <a:prstGeom prst="rect">
+            <a:avLst/>
+          </a:prstGeom>
+          <a:ln/>
+          <a:effectLst>
+            <a:outerShdw blurRad="50800" dist="38100" dir="2700000" algn="tl" rotWithShape="0">
+              <a:prstClr val="black">
+                <a:alpha val="40000"/>
+              </a:prstClr>
+            </a:outerShdw>
+          </a:effectLst>
+        </p:spPr>
+      </p:pic>
+      <p:pic>
+        <p:nvPicPr>
+          <p:cNvPr id="5" name="image50.png">
+            <a:extLst>
+              <a:ext uri="{FF2B5EF4-FFF2-40B4-BE49-F238E27FC236}">
+                <a16:creationId xmlns:a16="http://schemas.microsoft.com/office/drawing/2014/main" id="{CD0F6A68-A495-192D-4E24-DFBB96AA675E}"/>
+              </a:ext>
+            </a:extLst>
+          </p:cNvPr>
+          <p:cNvPicPr>
+            <a:picLocks noChangeAspect="1"/>
+          </p:cNvPicPr>
+          <p:nvPr/>
+        </p:nvPicPr>
+        <p:blipFill>
+          <a:blip r:embed="rId3"/>
+          <a:srcRect/>
+          <a:stretch>
+            <a:fillRect/>
+          </a:stretch>
+        </p:blipFill>
+        <p:spPr>
+          <a:xfrm>
+            <a:off x="824243" y="4222578"/>
+            <a:ext cx="6748575" cy="2144877"/>
+          </a:xfrm>
+          <a:prstGeom prst="rect">
+            <a:avLst/>
+          </a:prstGeom>
+          <a:ln/>
+          <a:effectLst>
+            <a:outerShdw blurRad="50800" dist="38100" dir="2700000" algn="tl" rotWithShape="0">
+              <a:prstClr val="black">
+                <a:alpha val="40000"/>
+              </a:prstClr>
+            </a:outerShdw>
+          </a:effectLst>
+        </p:spPr>
+      </p:pic>
+      <p:pic>
+        <p:nvPicPr>
+          <p:cNvPr id="6" name="image57.png">
+            <a:extLst>
+              <a:ext uri="{FF2B5EF4-FFF2-40B4-BE49-F238E27FC236}">
+                <a16:creationId xmlns:a16="http://schemas.microsoft.com/office/drawing/2014/main" id="{61DC7867-00FC-5ACD-EA54-57AFBFB3A563}"/>
+              </a:ext>
+            </a:extLst>
+          </p:cNvPr>
+          <p:cNvPicPr/>
+          <p:nvPr/>
+        </p:nvPicPr>
+        <p:blipFill>
+          <a:blip r:embed="rId4"/>
+          <a:srcRect/>
+          <a:stretch>
+            <a:fillRect/>
+          </a:stretch>
+        </p:blipFill>
+        <p:spPr>
+          <a:xfrm>
+            <a:off x="8240283" y="3632345"/>
+            <a:ext cx="3481070" cy="1180465"/>
+          </a:xfrm>
+          <a:prstGeom prst="rect">
+            <a:avLst/>
+          </a:prstGeom>
+          <a:ln/>
+          <a:effectLst>
+            <a:outerShdw blurRad="50800" dist="38100" dir="2700000" algn="tl" rotWithShape="0">
+              <a:prstClr val="black">
+                <a:alpha val="40000"/>
+              </a:prstClr>
+            </a:outerShdw>
+          </a:effectLst>
+        </p:spPr>
+      </p:pic>
     </p:spTree>
     <p:extLst>
       <p:ext uri="{BB962C8B-B14F-4D97-AF65-F5344CB8AC3E}">
@@ -4115,6 +4522,9 @@
   <p:clrMapOvr>
     <a:masterClrMapping/>
   </p:clrMapOvr>
+  <p:transition spd="med">
+    <p:pull/>
+  </p:transition>
 </p:sld>
 </file>
 
@@ -4137,7 +4547,13 @@
       </p:grpSpPr>
       <p:sp>
         <p:nvSpPr>
-          <p:cNvPr id="2" name="Cím 1"/>
+          <p:cNvPr id="2" name="Cím 1">
+            <a:extLst>
+              <a:ext uri="{FF2B5EF4-FFF2-40B4-BE49-F238E27FC236}">
+                <a16:creationId xmlns:a16="http://schemas.microsoft.com/office/drawing/2014/main" id="{26E00C1A-D1B8-F89E-1D8F-895F89DD10A2}"/>
+              </a:ext>
+            </a:extLst>
+          </p:cNvPr>
           <p:cNvSpPr>
             <a:spLocks noGrp="1"/>
           </p:cNvSpPr>
@@ -4151,27 +4567,34 @@
           <a:lstStyle/>
           <a:p>
             <a:r>
-              <a:rPr lang="hu-HU" dirty="0" smtClean="0">
+              <a:rPr lang="hu-HU" dirty="0">
                 <a:latin typeface="Times New Roman" panose="02020603050405020304" pitchFamily="18" charset="0"/>
                 <a:cs typeface="Times New Roman" panose="02020603050405020304" pitchFamily="18" charset="0"/>
               </a:rPr>
-              <a:t>Clubtagság bemutatása</a:t>
-            </a:r>
-            <a:endParaRPr lang="hu-HU" dirty="0">
-              <a:latin typeface="Times New Roman" panose="02020603050405020304" pitchFamily="18" charset="0"/>
-              <a:cs typeface="Times New Roman" panose="02020603050405020304" pitchFamily="18" charset="0"/>
-            </a:endParaRPr>
+              <a:t>Kosár bemutatása</a:t>
+            </a:r>
           </a:p>
         </p:txBody>
       </p:sp>
       <p:pic>
         <p:nvPicPr>
-          <p:cNvPr id="5" name="Kép 4"/>
-          <p:cNvPicPr/>
-          <p:nvPr/>
+          <p:cNvPr id="4" name="image48.png">
+            <a:extLst>
+              <a:ext uri="{FF2B5EF4-FFF2-40B4-BE49-F238E27FC236}">
+                <a16:creationId xmlns:a16="http://schemas.microsoft.com/office/drawing/2014/main" id="{7C4148FA-17A9-8F35-09E2-A5BDE9A8CE19}"/>
+              </a:ext>
+            </a:extLst>
+          </p:cNvPr>
+          <p:cNvPicPr>
+            <a:picLocks noGrp="1" noChangeAspect="1"/>
+          </p:cNvPicPr>
+          <p:nvPr>
+            <p:ph idx="1"/>
+          </p:nvPr>
         </p:nvPicPr>
         <p:blipFill>
           <a:blip r:embed="rId2"/>
+          <a:srcRect/>
           <a:stretch>
             <a:fillRect/>
           </a:stretch>
@@ -4179,83 +4602,173 @@
         <p:spPr>
           <a:xfrm>
             <a:off x="838200" y="1690688"/>
-            <a:ext cx="2531745" cy="4876800"/>
+            <a:ext cx="5919439" cy="1505975"/>
           </a:xfrm>
           <a:prstGeom prst="rect">
             <a:avLst/>
           </a:prstGeom>
-          <a:ln>
-            <a:noFill/>
-          </a:ln>
+          <a:ln/>
           <a:effectLst>
-            <a:outerShdw blurRad="292100" dist="139700" dir="2700000" algn="tl" rotWithShape="0">
-              <a:srgbClr val="333333">
-                <a:alpha val="65000"/>
-              </a:srgbClr>
+            <a:outerShdw blurRad="50800" dist="38100" dir="2700000" algn="tl" rotWithShape="0">
+              <a:prstClr val="black">
+                <a:alpha val="40000"/>
+              </a:prstClr>
             </a:outerShdw>
           </a:effectLst>
         </p:spPr>
       </p:pic>
       <p:pic>
         <p:nvPicPr>
-          <p:cNvPr id="6" name="Kép 5"/>
-          <p:cNvPicPr/>
+          <p:cNvPr id="5" name="image47.png">
+            <a:extLst>
+              <a:ext uri="{FF2B5EF4-FFF2-40B4-BE49-F238E27FC236}">
+                <a16:creationId xmlns:a16="http://schemas.microsoft.com/office/drawing/2014/main" id="{69803113-C70E-9736-E3E1-94347DE31420}"/>
+              </a:ext>
+            </a:extLst>
+          </p:cNvPr>
+          <p:cNvPicPr>
+            <a:picLocks noChangeAspect="1"/>
+          </p:cNvPicPr>
           <p:nvPr/>
         </p:nvPicPr>
         <p:blipFill>
           <a:blip r:embed="rId3"/>
+          <a:srcRect/>
           <a:stretch>
             <a:fillRect/>
           </a:stretch>
         </p:blipFill>
         <p:spPr>
           <a:xfrm>
-            <a:off x="5140804" y="2268658"/>
-            <a:ext cx="4960692" cy="1716746"/>
+            <a:off x="838200" y="3661337"/>
+            <a:ext cx="5919438" cy="1734729"/>
           </a:xfrm>
           <a:prstGeom prst="rect">
             <a:avLst/>
           </a:prstGeom>
-          <a:ln>
-            <a:noFill/>
-          </a:ln>
+          <a:ln/>
           <a:effectLst>
-            <a:outerShdw blurRad="292100" dist="139700" dir="2700000" algn="tl" rotWithShape="0">
-              <a:srgbClr val="333333">
-                <a:alpha val="65000"/>
-              </a:srgbClr>
+            <a:outerShdw blurRad="50800" dist="38100" dir="2700000" algn="tl" rotWithShape="0">
+              <a:prstClr val="black">
+                <a:alpha val="40000"/>
+              </a:prstClr>
             </a:outerShdw>
           </a:effectLst>
         </p:spPr>
       </p:pic>
       <p:pic>
         <p:nvPicPr>
-          <p:cNvPr id="7" name="Kép 6"/>
-          <p:cNvPicPr/>
+          <p:cNvPr id="6" name="image49.png">
+            <a:extLst>
+              <a:ext uri="{FF2B5EF4-FFF2-40B4-BE49-F238E27FC236}">
+                <a16:creationId xmlns:a16="http://schemas.microsoft.com/office/drawing/2014/main" id="{DF481F9F-B629-8D6E-F951-6D9FED250A28}"/>
+              </a:ext>
+            </a:extLst>
+          </p:cNvPr>
+          <p:cNvPicPr>
+            <a:picLocks noChangeAspect="1"/>
+          </p:cNvPicPr>
           <p:nvPr/>
         </p:nvPicPr>
         <p:blipFill>
           <a:blip r:embed="rId4"/>
+          <a:srcRect/>
           <a:stretch>
             <a:fillRect/>
           </a:stretch>
         </p:blipFill>
         <p:spPr>
           <a:xfrm>
-            <a:off x="3888500" y="4822165"/>
-            <a:ext cx="7465300" cy="675197"/>
+            <a:off x="7002633" y="1690689"/>
+            <a:ext cx="2147466" cy="3705378"/>
           </a:xfrm>
           <a:prstGeom prst="rect">
             <a:avLst/>
           </a:prstGeom>
-          <a:ln>
-            <a:noFill/>
-          </a:ln>
+          <a:ln/>
           <a:effectLst>
-            <a:outerShdw blurRad="292100" dist="139700" dir="2700000" algn="tl" rotWithShape="0">
-              <a:srgbClr val="333333">
-                <a:alpha val="65000"/>
-              </a:srgbClr>
+            <a:outerShdw blurRad="50800" dist="38100" dir="2700000" algn="tl" rotWithShape="0">
+              <a:prstClr val="black">
+                <a:alpha val="40000"/>
+              </a:prstClr>
+            </a:outerShdw>
+          </a:effectLst>
+        </p:spPr>
+      </p:pic>
+      <p:pic>
+        <p:nvPicPr>
+          <p:cNvPr id="7" name="image39.png">
+            <a:extLst>
+              <a:ext uri="{FF2B5EF4-FFF2-40B4-BE49-F238E27FC236}">
+                <a16:creationId xmlns:a16="http://schemas.microsoft.com/office/drawing/2014/main" id="{D2B98E80-4A60-E258-205E-90B080DE4FA7}"/>
+              </a:ext>
+            </a:extLst>
+          </p:cNvPr>
+          <p:cNvPicPr>
+            <a:picLocks noChangeAspect="1"/>
+          </p:cNvPicPr>
+          <p:nvPr/>
+        </p:nvPicPr>
+        <p:blipFill>
+          <a:blip r:embed="rId5"/>
+          <a:srcRect/>
+          <a:stretch>
+            <a:fillRect/>
+          </a:stretch>
+        </p:blipFill>
+        <p:spPr>
+          <a:xfrm>
+            <a:off x="9301588" y="3084701"/>
+            <a:ext cx="2730577" cy="917354"/>
+          </a:xfrm>
+          <a:prstGeom prst="rect">
+            <a:avLst/>
+          </a:prstGeom>
+          <a:ln/>
+          <a:effectLst>
+            <a:outerShdw blurRad="50800" dist="38100" dir="2700000" algn="tl" rotWithShape="0">
+              <a:prstClr val="black">
+                <a:alpha val="40000"/>
+              </a:prstClr>
+            </a:outerShdw>
+          </a:effectLst>
+        </p:spPr>
+      </p:pic>
+      <p:pic>
+        <p:nvPicPr>
+          <p:cNvPr id="8" name="image36.png">
+            <a:extLst>
+              <a:ext uri="{FF2B5EF4-FFF2-40B4-BE49-F238E27FC236}">
+                <a16:creationId xmlns:a16="http://schemas.microsoft.com/office/drawing/2014/main" id="{C236592B-DA45-9721-C336-FFF88EE97D0B}"/>
+              </a:ext>
+            </a:extLst>
+          </p:cNvPr>
+          <p:cNvPicPr>
+            <a:picLocks noChangeAspect="1"/>
+          </p:cNvPicPr>
+          <p:nvPr/>
+        </p:nvPicPr>
+        <p:blipFill>
+          <a:blip r:embed="rId6"/>
+          <a:srcRect/>
+          <a:stretch>
+            <a:fillRect/>
+          </a:stretch>
+        </p:blipFill>
+        <p:spPr>
+          <a:xfrm>
+            <a:off x="612901" y="5860740"/>
+            <a:ext cx="10966197" cy="551211"/>
+          </a:xfrm>
+          <a:prstGeom prst="rect">
+            <a:avLst/>
+          </a:prstGeom>
+          <a:ln/>
+          <a:effectLst>
+            <a:outerShdw blurRad="50800" dist="38100" dir="2700000" algn="tl" rotWithShape="0">
+              <a:prstClr val="black">
+                <a:alpha val="40000"/>
+              </a:prstClr>
             </a:outerShdw>
           </a:effectLst>
         </p:spPr>
@@ -4263,20 +4776,16 @@
     </p:spTree>
     <p:extLst>
       <p:ext uri="{BB962C8B-B14F-4D97-AF65-F5344CB8AC3E}">
-        <p14:creationId xmlns:p14="http://schemas.microsoft.com/office/powerpoint/2010/main" val="1232202109"/>
+        <p14:creationId xmlns:p14="http://schemas.microsoft.com/office/powerpoint/2010/main" val="3698605848"/>
       </p:ext>
     </p:extLst>
   </p:cSld>
   <p:clrMapOvr>
     <a:masterClrMapping/>
   </p:clrMapOvr>
-  <p:timing>
-    <p:tnLst>
-      <p:par>
-        <p:cTn id="1" dur="indefinite" restart="never" nodeType="tmRoot"/>
-      </p:par>
-    </p:tnLst>
-  </p:timing>
+  <p:transition spd="med">
+    <p:pull/>
+  </p:transition>
 </p:sld>
 </file>
 

</xml_diff>